<commit_message>
Doladeni ukolu 4 a 5+ hrube popisky
</commit_message>
<xml_diff>
--- a/Nový Prezentace Microsoft PowerPointu.pptx
+++ b/Nový Prezentace Microsoft PowerPointu.pptx
@@ -9,6 +9,8 @@
     <p:sldId id="257" r:id="rId3"/>
     <p:sldId id="258" r:id="rId4"/>
     <p:sldId id="259" r:id="rId5"/>
+    <p:sldId id="260" r:id="rId6"/>
+    <p:sldId id="261" r:id="rId7"/>
   </p:sldIdLst>
   <p:sldSz cx="12192000" cy="6858000"/>
   <p:notesSz cx="6858000" cy="9144000"/>
@@ -262,7 +264,7 @@
           <a:p>
             <a:fld id="{C19D884C-08E6-4EAC-BA94-638BFB38667E}" type="datetimeFigureOut">
               <a:rPr lang="cs-CZ" smtClean="0"/>
-              <a:t>14.10.2024</a:t>
+              <a:t>15.10.2024</a:t>
             </a:fld>
             <a:endParaRPr lang="cs-CZ"/>
           </a:p>
@@ -460,7 +462,7 @@
           <a:p>
             <a:fld id="{C19D884C-08E6-4EAC-BA94-638BFB38667E}" type="datetimeFigureOut">
               <a:rPr lang="cs-CZ" smtClean="0"/>
-              <a:t>14.10.2024</a:t>
+              <a:t>15.10.2024</a:t>
             </a:fld>
             <a:endParaRPr lang="cs-CZ"/>
           </a:p>
@@ -668,7 +670,7 @@
           <a:p>
             <a:fld id="{C19D884C-08E6-4EAC-BA94-638BFB38667E}" type="datetimeFigureOut">
               <a:rPr lang="cs-CZ" smtClean="0"/>
-              <a:t>14.10.2024</a:t>
+              <a:t>15.10.2024</a:t>
             </a:fld>
             <a:endParaRPr lang="cs-CZ"/>
           </a:p>
@@ -866,7 +868,7 @@
           <a:p>
             <a:fld id="{C19D884C-08E6-4EAC-BA94-638BFB38667E}" type="datetimeFigureOut">
               <a:rPr lang="cs-CZ" smtClean="0"/>
-              <a:t>14.10.2024</a:t>
+              <a:t>15.10.2024</a:t>
             </a:fld>
             <a:endParaRPr lang="cs-CZ"/>
           </a:p>
@@ -1141,7 +1143,7 @@
           <a:p>
             <a:fld id="{C19D884C-08E6-4EAC-BA94-638BFB38667E}" type="datetimeFigureOut">
               <a:rPr lang="cs-CZ" smtClean="0"/>
-              <a:t>14.10.2024</a:t>
+              <a:t>15.10.2024</a:t>
             </a:fld>
             <a:endParaRPr lang="cs-CZ"/>
           </a:p>
@@ -1406,7 +1408,7 @@
           <a:p>
             <a:fld id="{C19D884C-08E6-4EAC-BA94-638BFB38667E}" type="datetimeFigureOut">
               <a:rPr lang="cs-CZ" smtClean="0"/>
-              <a:t>14.10.2024</a:t>
+              <a:t>15.10.2024</a:t>
             </a:fld>
             <a:endParaRPr lang="cs-CZ"/>
           </a:p>
@@ -1818,7 +1820,7 @@
           <a:p>
             <a:fld id="{C19D884C-08E6-4EAC-BA94-638BFB38667E}" type="datetimeFigureOut">
               <a:rPr lang="cs-CZ" smtClean="0"/>
-              <a:t>14.10.2024</a:t>
+              <a:t>15.10.2024</a:t>
             </a:fld>
             <a:endParaRPr lang="cs-CZ"/>
           </a:p>
@@ -1959,7 +1961,7 @@
           <a:p>
             <a:fld id="{C19D884C-08E6-4EAC-BA94-638BFB38667E}" type="datetimeFigureOut">
               <a:rPr lang="cs-CZ" smtClean="0"/>
-              <a:t>14.10.2024</a:t>
+              <a:t>15.10.2024</a:t>
             </a:fld>
             <a:endParaRPr lang="cs-CZ"/>
           </a:p>
@@ -2072,7 +2074,7 @@
           <a:p>
             <a:fld id="{C19D884C-08E6-4EAC-BA94-638BFB38667E}" type="datetimeFigureOut">
               <a:rPr lang="cs-CZ" smtClean="0"/>
-              <a:t>14.10.2024</a:t>
+              <a:t>15.10.2024</a:t>
             </a:fld>
             <a:endParaRPr lang="cs-CZ"/>
           </a:p>
@@ -2383,7 +2385,7 @@
           <a:p>
             <a:fld id="{C19D884C-08E6-4EAC-BA94-638BFB38667E}" type="datetimeFigureOut">
               <a:rPr lang="cs-CZ" smtClean="0"/>
-              <a:t>14.10.2024</a:t>
+              <a:t>15.10.2024</a:t>
             </a:fld>
             <a:endParaRPr lang="cs-CZ"/>
           </a:p>
@@ -2671,7 +2673,7 @@
           <a:p>
             <a:fld id="{C19D884C-08E6-4EAC-BA94-638BFB38667E}" type="datetimeFigureOut">
               <a:rPr lang="cs-CZ" smtClean="0"/>
-              <a:t>14.10.2024</a:t>
+              <a:t>15.10.2024</a:t>
             </a:fld>
             <a:endParaRPr lang="cs-CZ"/>
           </a:p>
@@ -2912,7 +2914,7 @@
           <a:p>
             <a:fld id="{C19D884C-08E6-4EAC-BA94-638BFB38667E}" type="datetimeFigureOut">
               <a:rPr lang="cs-CZ" smtClean="0"/>
-              <a:t>14.10.2024</a:t>
+              <a:t>15.10.2024</a:t>
             </a:fld>
             <a:endParaRPr lang="cs-CZ"/>
           </a:p>
@@ -3926,6 +3928,307 @@
 </p:sld>
 </file>
 
+<file path=ppt/slides/slide5.xml><?xml version="1.0" encoding="utf-8"?>
+<p:sld xmlns:a="http://schemas.openxmlformats.org/drawingml/2006/main" xmlns:r="http://schemas.openxmlformats.org/officeDocument/2006/relationships" xmlns:p="http://schemas.openxmlformats.org/presentationml/2006/main">
+  <p:cSld>
+    <p:spTree>
+      <p:nvGrpSpPr>
+        <p:cNvPr id="1" name=""/>
+        <p:cNvGrpSpPr/>
+        <p:nvPr/>
+      </p:nvGrpSpPr>
+      <p:grpSpPr>
+        <a:xfrm>
+          <a:off x="0" y="0"/>
+          <a:ext cx="0" cy="0"/>
+          <a:chOff x="0" y="0"/>
+          <a:chExt cx="0" cy="0"/>
+        </a:xfrm>
+      </p:grpSpPr>
+      <p:sp>
+        <p:nvSpPr>
+          <p:cNvPr id="3" name="Zástupný obsah 2">
+            <a:extLst>
+              <a:ext uri="{FF2B5EF4-FFF2-40B4-BE49-F238E27FC236}">
+                <a16:creationId xmlns:a16="http://schemas.microsoft.com/office/drawing/2014/main" id="{C573A0CD-C5AC-FAD6-208B-BE70674A48A3}"/>
+              </a:ext>
+            </a:extLst>
+          </p:cNvPr>
+          <p:cNvSpPr>
+            <a:spLocks noGrp="1"/>
+          </p:cNvSpPr>
+          <p:nvPr>
+            <p:ph idx="1"/>
+          </p:nvPr>
+        </p:nvSpPr>
+        <p:spPr>
+          <a:xfrm>
+            <a:off x="838200" y="2577063"/>
+            <a:ext cx="10515600" cy="4351338"/>
+          </a:xfrm>
+        </p:spPr>
+        <p:txBody>
+          <a:bodyPr/>
+          <a:lstStyle/>
+          <a:p>
+            <a:r>
+              <a:rPr lang="cs-CZ" dirty="0"/>
+              <a:t>Data ukazují výši průměrných platů za celý rok, průměr všech cen za celý rok.</a:t>
+            </a:r>
+          </a:p>
+          <a:p>
+            <a:r>
+              <a:rPr lang="cs-CZ" dirty="0"/>
+              <a:t>Následuje výpočet meziročního růstu platů a meziročního růstu cen potravin.</a:t>
+            </a:r>
+          </a:p>
+          <a:p>
+            <a:endParaRPr lang="cs-CZ" dirty="0"/>
+          </a:p>
+          <a:p>
+            <a:pPr marL="0" indent="0">
+              <a:buNone/>
+            </a:pPr>
+            <a:r>
+              <a:rPr lang="cs-CZ" dirty="0"/>
+              <a:t>Z dat je vidět, že potraviny nerostli </a:t>
+            </a:r>
+            <a:r>
+              <a:rPr lang="cs-CZ" dirty="0" err="1"/>
+              <a:t>výraznějí</a:t>
+            </a:r>
+            <a:r>
+              <a:rPr lang="cs-CZ" dirty="0"/>
+              <a:t> než platy. Největší růst potravin, oproti platům byl zaznamenán v roce 2013, s rozdílovou hodnotou 6,71%</a:t>
+            </a:r>
+          </a:p>
+        </p:txBody>
+      </p:sp>
+      <p:pic>
+        <p:nvPicPr>
+          <p:cNvPr id="7" name="Obrázek 6">
+            <a:extLst>
+              <a:ext uri="{FF2B5EF4-FFF2-40B4-BE49-F238E27FC236}">
+                <a16:creationId xmlns:a16="http://schemas.microsoft.com/office/drawing/2014/main" id="{A8C614E4-F169-F959-E757-C9293BDA0EA7}"/>
+              </a:ext>
+            </a:extLst>
+          </p:cNvPr>
+          <p:cNvPicPr>
+            <a:picLocks noChangeAspect="1"/>
+          </p:cNvPicPr>
+          <p:nvPr/>
+        </p:nvPicPr>
+        <p:blipFill>
+          <a:blip r:embed="rId2"/>
+          <a:stretch>
+            <a:fillRect/>
+          </a:stretch>
+        </p:blipFill>
+        <p:spPr>
+          <a:xfrm>
+            <a:off x="1789961" y="90691"/>
+            <a:ext cx="7887801" cy="2486372"/>
+          </a:xfrm>
+          <a:prstGeom prst="rect">
+            <a:avLst/>
+          </a:prstGeom>
+        </p:spPr>
+      </p:pic>
+    </p:spTree>
+    <p:extLst>
+      <p:ext uri="{BB962C8B-B14F-4D97-AF65-F5344CB8AC3E}">
+        <p14:creationId xmlns:p14="http://schemas.microsoft.com/office/powerpoint/2010/main" val="3086538568"/>
+      </p:ext>
+    </p:extLst>
+  </p:cSld>
+  <p:clrMapOvr>
+    <a:masterClrMapping/>
+  </p:clrMapOvr>
+</p:sld>
+</file>
+
+<file path=ppt/slides/slide6.xml><?xml version="1.0" encoding="utf-8"?>
+<p:sld xmlns:a="http://schemas.openxmlformats.org/drawingml/2006/main" xmlns:r="http://schemas.openxmlformats.org/officeDocument/2006/relationships" xmlns:p="http://schemas.openxmlformats.org/presentationml/2006/main">
+  <p:cSld>
+    <p:spTree>
+      <p:nvGrpSpPr>
+        <p:cNvPr id="1" name=""/>
+        <p:cNvGrpSpPr/>
+        <p:nvPr/>
+      </p:nvGrpSpPr>
+      <p:grpSpPr>
+        <a:xfrm>
+          <a:off x="0" y="0"/>
+          <a:ext cx="0" cy="0"/>
+          <a:chOff x="0" y="0"/>
+          <a:chExt cx="0" cy="0"/>
+        </a:xfrm>
+      </p:grpSpPr>
+      <p:sp>
+        <p:nvSpPr>
+          <p:cNvPr id="3" name="Zástupný obsah 2">
+            <a:extLst>
+              <a:ext uri="{FF2B5EF4-FFF2-40B4-BE49-F238E27FC236}">
+                <a16:creationId xmlns:a16="http://schemas.microsoft.com/office/drawing/2014/main" id="{9A1A917E-AC3E-4EBB-5C0A-515172E8F5A4}"/>
+              </a:ext>
+            </a:extLst>
+          </p:cNvPr>
+          <p:cNvSpPr>
+            <a:spLocks noGrp="1"/>
+          </p:cNvSpPr>
+          <p:nvPr>
+            <p:ph idx="1"/>
+          </p:nvPr>
+        </p:nvSpPr>
+        <p:spPr>
+          <a:xfrm>
+            <a:off x="838200" y="2410161"/>
+            <a:ext cx="10515600" cy="4351338"/>
+          </a:xfrm>
+        </p:spPr>
+        <p:txBody>
+          <a:bodyPr>
+            <a:normAutofit lnSpcReduction="10000"/>
+          </a:bodyPr>
+          <a:lstStyle/>
+          <a:p>
+            <a:pPr marL="0" indent="0">
+              <a:buNone/>
+            </a:pPr>
+            <a:r>
+              <a:rPr lang="cs-CZ" sz="2000" dirty="0"/>
+              <a:t>Zde máme stejnou tabulku z předchozí stránky, doplněnou o meziroční růst HDP.</a:t>
+            </a:r>
+          </a:p>
+          <a:p>
+            <a:pPr marL="0" indent="0">
+              <a:buNone/>
+            </a:pPr>
+            <a:r>
+              <a:rPr lang="cs-CZ" sz="2000" dirty="0"/>
+              <a:t>Vidíme zde několik poklesů HDP. Který byl dán ekonomickou krizí 2008 a krizí eurozóny.</a:t>
+            </a:r>
+          </a:p>
+          <a:p>
+            <a:pPr marL="0" indent="0">
+              <a:buNone/>
+            </a:pPr>
+            <a:r>
+              <a:rPr lang="cs-CZ" sz="2000" dirty="0"/>
+              <a:t>Pokud budeme chtít opovědět na otázku, jestli s výrazným růstem HDP rostou i mzdy a potraviny.</a:t>
+            </a:r>
+          </a:p>
+          <a:p>
+            <a:pPr marL="0" indent="0">
+              <a:buNone/>
+            </a:pPr>
+            <a:r>
+              <a:rPr lang="cs-CZ" sz="2000" dirty="0"/>
+              <a:t> 	K výraznějšímu růstu HDP (nad 5%) došlo ve třech případech.</a:t>
+            </a:r>
+          </a:p>
+          <a:p>
+            <a:pPr marL="0" indent="0">
+              <a:buNone/>
+            </a:pPr>
+            <a:r>
+              <a:rPr lang="cs-CZ" sz="2000" dirty="0"/>
+              <a:t>	rok 2007		V tomto roce je vidět i růst mezd a růst cen a to i v roce následujícím.</a:t>
+            </a:r>
+          </a:p>
+          <a:p>
+            <a:pPr marL="0" indent="0">
+              <a:buNone/>
+            </a:pPr>
+            <a:r>
+              <a:rPr lang="cs-CZ" sz="2000" dirty="0"/>
+              <a:t>	rok 2015		Růst mezd je nepatrný. U cen je zaznamenám pokles</a:t>
+            </a:r>
+          </a:p>
+          <a:p>
+            <a:pPr marL="0" indent="0">
+              <a:buNone/>
+            </a:pPr>
+            <a:r>
+              <a:rPr lang="cs-CZ" sz="2000" dirty="0"/>
+              <a:t>	rok 2017		V tomto i následujícím roce vidíme stejnou situaci jako </a:t>
+            </a:r>
+          </a:p>
+          <a:p>
+            <a:pPr marL="0" indent="0">
+              <a:buNone/>
+            </a:pPr>
+            <a:r>
+              <a:rPr lang="cs-CZ" sz="2000" dirty="0"/>
+              <a:t>			v roce 2007. Došlo k růstu platů i cen a to i v roce následujícím.</a:t>
+            </a:r>
+          </a:p>
+          <a:p>
+            <a:pPr marL="0" indent="0">
+              <a:buNone/>
+            </a:pPr>
+            <a:r>
+              <a:rPr lang="cs-CZ" sz="1600" dirty="0"/>
+              <a:t>Nedá se úplně odpovědět na otázku, zdali s výraznějším růstem HDP automaticky výrazněji rostou platy i ceny potravin. Pravděpodobnost je dvoutřetinová. Růst HDP ovlivňuje růst potravin nepřímo (výše platů se projeví do nákladů). Odchylka, která nastala v roce 2015 může být dána tím, že v ekonomice nebylo stejné prostředí jako v roce 2007 a 2015. Mohli být jiné úrokové sazby, ceny </a:t>
+            </a:r>
+            <a:r>
+              <a:rPr lang="cs-CZ" sz="1600" err="1"/>
+              <a:t>energií</a:t>
+            </a:r>
+            <a:r>
+              <a:rPr lang="cs-CZ" sz="1600"/>
+              <a:t>,rozdílné</a:t>
+            </a:r>
+            <a:r>
+              <a:rPr lang="cs-CZ" sz="1600" dirty="0"/>
+              <a:t> ekonomické vládní stimuly pro firmy a rodiny. Potřebovali bychom více dat, abych zjistili proč v tento rok výrazněji mzdy a ceny potravin nevzrostli.</a:t>
+            </a:r>
+          </a:p>
+        </p:txBody>
+      </p:sp>
+      <p:pic>
+        <p:nvPicPr>
+          <p:cNvPr id="5" name="Obrázek 4">
+            <a:extLst>
+              <a:ext uri="{FF2B5EF4-FFF2-40B4-BE49-F238E27FC236}">
+                <a16:creationId xmlns:a16="http://schemas.microsoft.com/office/drawing/2014/main" id="{B1676D86-64F5-6C02-4618-86D9031C4594}"/>
+              </a:ext>
+            </a:extLst>
+          </p:cNvPr>
+          <p:cNvPicPr>
+            <a:picLocks noChangeAspect="1"/>
+          </p:cNvPicPr>
+          <p:nvPr/>
+        </p:nvPicPr>
+        <p:blipFill>
+          <a:blip r:embed="rId2"/>
+          <a:stretch>
+            <a:fillRect/>
+          </a:stretch>
+        </p:blipFill>
+        <p:spPr>
+          <a:xfrm>
+            <a:off x="1251319" y="0"/>
+            <a:ext cx="9345329" cy="2410161"/>
+          </a:xfrm>
+          <a:prstGeom prst="rect">
+            <a:avLst/>
+          </a:prstGeom>
+        </p:spPr>
+      </p:pic>
+    </p:spTree>
+    <p:extLst>
+      <p:ext uri="{BB962C8B-B14F-4D97-AF65-F5344CB8AC3E}">
+        <p14:creationId xmlns:p14="http://schemas.microsoft.com/office/powerpoint/2010/main" val="3348774748"/>
+      </p:ext>
+    </p:extLst>
+  </p:cSld>
+  <p:clrMapOvr>
+    <a:masterClrMapping/>
+  </p:clrMapOvr>
+</p:sld>
+</file>
+
 <file path=ppt/theme/theme1.xml><?xml version="1.0" encoding="utf-8"?>
 <a:theme xmlns:a="http://schemas.openxmlformats.org/drawingml/2006/main" name="Motiv Office">
   <a:themeElements>

</xml_diff>

<commit_message>
oprava ve vypoctu, pridani souboru
</commit_message>
<xml_diff>
--- a/Nový Prezentace Microsoft PowerPointu.pptx
+++ b/Nový Prezentace Microsoft PowerPointu.pptx
@@ -7,10 +7,9 @@
   <p:sldIdLst>
     <p:sldId id="256" r:id="rId2"/>
     <p:sldId id="257" r:id="rId3"/>
-    <p:sldId id="258" r:id="rId4"/>
-    <p:sldId id="259" r:id="rId5"/>
-    <p:sldId id="260" r:id="rId6"/>
-    <p:sldId id="261" r:id="rId7"/>
+    <p:sldId id="259" r:id="rId4"/>
+    <p:sldId id="260" r:id="rId5"/>
+    <p:sldId id="261" r:id="rId6"/>
   </p:sldIdLst>
   <p:sldSz cx="12192000" cy="6858000"/>
   <p:notesSz cx="6858000" cy="9144000"/>
@@ -264,7 +263,7 @@
           <a:p>
             <a:fld id="{C19D884C-08E6-4EAC-BA94-638BFB38667E}" type="datetimeFigureOut">
               <a:rPr lang="cs-CZ" smtClean="0"/>
-              <a:t>15.10.2024</a:t>
+              <a:t>16.10.2024</a:t>
             </a:fld>
             <a:endParaRPr lang="cs-CZ"/>
           </a:p>
@@ -462,7 +461,7 @@
           <a:p>
             <a:fld id="{C19D884C-08E6-4EAC-BA94-638BFB38667E}" type="datetimeFigureOut">
               <a:rPr lang="cs-CZ" smtClean="0"/>
-              <a:t>15.10.2024</a:t>
+              <a:t>16.10.2024</a:t>
             </a:fld>
             <a:endParaRPr lang="cs-CZ"/>
           </a:p>
@@ -670,7 +669,7 @@
           <a:p>
             <a:fld id="{C19D884C-08E6-4EAC-BA94-638BFB38667E}" type="datetimeFigureOut">
               <a:rPr lang="cs-CZ" smtClean="0"/>
-              <a:t>15.10.2024</a:t>
+              <a:t>16.10.2024</a:t>
             </a:fld>
             <a:endParaRPr lang="cs-CZ"/>
           </a:p>
@@ -868,7 +867,7 @@
           <a:p>
             <a:fld id="{C19D884C-08E6-4EAC-BA94-638BFB38667E}" type="datetimeFigureOut">
               <a:rPr lang="cs-CZ" smtClean="0"/>
-              <a:t>15.10.2024</a:t>
+              <a:t>16.10.2024</a:t>
             </a:fld>
             <a:endParaRPr lang="cs-CZ"/>
           </a:p>
@@ -1143,7 +1142,7 @@
           <a:p>
             <a:fld id="{C19D884C-08E6-4EAC-BA94-638BFB38667E}" type="datetimeFigureOut">
               <a:rPr lang="cs-CZ" smtClean="0"/>
-              <a:t>15.10.2024</a:t>
+              <a:t>16.10.2024</a:t>
             </a:fld>
             <a:endParaRPr lang="cs-CZ"/>
           </a:p>
@@ -1408,7 +1407,7 @@
           <a:p>
             <a:fld id="{C19D884C-08E6-4EAC-BA94-638BFB38667E}" type="datetimeFigureOut">
               <a:rPr lang="cs-CZ" smtClean="0"/>
-              <a:t>15.10.2024</a:t>
+              <a:t>16.10.2024</a:t>
             </a:fld>
             <a:endParaRPr lang="cs-CZ"/>
           </a:p>
@@ -1820,7 +1819,7 @@
           <a:p>
             <a:fld id="{C19D884C-08E6-4EAC-BA94-638BFB38667E}" type="datetimeFigureOut">
               <a:rPr lang="cs-CZ" smtClean="0"/>
-              <a:t>15.10.2024</a:t>
+              <a:t>16.10.2024</a:t>
             </a:fld>
             <a:endParaRPr lang="cs-CZ"/>
           </a:p>
@@ -1961,7 +1960,7 @@
           <a:p>
             <a:fld id="{C19D884C-08E6-4EAC-BA94-638BFB38667E}" type="datetimeFigureOut">
               <a:rPr lang="cs-CZ" smtClean="0"/>
-              <a:t>15.10.2024</a:t>
+              <a:t>16.10.2024</a:t>
             </a:fld>
             <a:endParaRPr lang="cs-CZ"/>
           </a:p>
@@ -2074,7 +2073,7 @@
           <a:p>
             <a:fld id="{C19D884C-08E6-4EAC-BA94-638BFB38667E}" type="datetimeFigureOut">
               <a:rPr lang="cs-CZ" smtClean="0"/>
-              <a:t>15.10.2024</a:t>
+              <a:t>16.10.2024</a:t>
             </a:fld>
             <a:endParaRPr lang="cs-CZ"/>
           </a:p>
@@ -2385,7 +2384,7 @@
           <a:p>
             <a:fld id="{C19D884C-08E6-4EAC-BA94-638BFB38667E}" type="datetimeFigureOut">
               <a:rPr lang="cs-CZ" smtClean="0"/>
-              <a:t>15.10.2024</a:t>
+              <a:t>16.10.2024</a:t>
             </a:fld>
             <a:endParaRPr lang="cs-CZ"/>
           </a:p>
@@ -2673,7 +2672,7 @@
           <a:p>
             <a:fld id="{C19D884C-08E6-4EAC-BA94-638BFB38667E}" type="datetimeFigureOut">
               <a:rPr lang="cs-CZ" smtClean="0"/>
-              <a:t>15.10.2024</a:t>
+              <a:t>16.10.2024</a:t>
             </a:fld>
             <a:endParaRPr lang="cs-CZ"/>
           </a:p>
@@ -2914,7 +2913,7 @@
           <a:p>
             <a:fld id="{C19D884C-08E6-4EAC-BA94-638BFB38667E}" type="datetimeFigureOut">
               <a:rPr lang="cs-CZ" smtClean="0"/>
-              <a:t>15.10.2024</a:t>
+              <a:t>16.10.2024</a:t>
             </a:fld>
             <a:endParaRPr lang="cs-CZ"/>
           </a:p>
@@ -3394,12 +3393,176 @@
           </a:p>
         </p:txBody>
       </p:sp>
+      <p:sp>
+        <p:nvSpPr>
+          <p:cNvPr id="10" name="TextovéPole 9">
+            <a:extLst>
+              <a:ext uri="{FF2B5EF4-FFF2-40B4-BE49-F238E27FC236}">
+                <a16:creationId xmlns:a16="http://schemas.microsoft.com/office/drawing/2014/main" id="{E0236463-53FD-19CA-3EC5-428029808C21}"/>
+              </a:ext>
+            </a:extLst>
+          </p:cNvPr>
+          <p:cNvSpPr txBox="1"/>
+          <p:nvPr/>
+        </p:nvSpPr>
+        <p:spPr>
+          <a:xfrm>
+            <a:off x="0" y="3961628"/>
+            <a:ext cx="12192000" cy="923330"/>
+          </a:xfrm>
+          <a:prstGeom prst="rect">
+            <a:avLst/>
+          </a:prstGeom>
+          <a:noFill/>
+        </p:spPr>
+        <p:txBody>
+          <a:bodyPr wrap="square" rtlCol="0">
+            <a:spAutoFit/>
+          </a:bodyPr>
+          <a:lstStyle/>
+          <a:p>
+            <a:r>
+              <a:rPr lang="cs-CZ" dirty="0"/>
+              <a:t>V sloupci </a:t>
+            </a:r>
+            <a:r>
+              <a:rPr lang="cs-CZ" dirty="0" err="1"/>
+              <a:t>Diff</a:t>
+            </a:r>
+            <a:r>
+              <a:rPr lang="cs-CZ" dirty="0"/>
+              <a:t>. Vidíme o kolik se částka zvýšila za měřitelné období v peněžním vyjádření. V následném sloupci </a:t>
+            </a:r>
+            <a:r>
+              <a:rPr lang="cs-CZ" dirty="0" err="1"/>
+              <a:t>Growth</a:t>
+            </a:r>
+            <a:r>
+              <a:rPr lang="cs-CZ" dirty="0"/>
+              <a:t> je vyjádření v procentech.</a:t>
+            </a:r>
+          </a:p>
+          <a:p>
+            <a:r>
+              <a:rPr lang="cs-CZ" dirty="0"/>
+              <a:t>	</a:t>
+            </a:r>
+          </a:p>
+        </p:txBody>
+      </p:sp>
+      <p:sp>
+        <p:nvSpPr>
+          <p:cNvPr id="11" name="TextovéPole 10">
+            <a:extLst>
+              <a:ext uri="{FF2B5EF4-FFF2-40B4-BE49-F238E27FC236}">
+                <a16:creationId xmlns:a16="http://schemas.microsoft.com/office/drawing/2014/main" id="{0113A3A0-9844-180E-5825-DA7017604C5D}"/>
+              </a:ext>
+            </a:extLst>
+          </p:cNvPr>
+          <p:cNvSpPr txBox="1"/>
+          <p:nvPr/>
+        </p:nvSpPr>
+        <p:spPr>
+          <a:xfrm>
+            <a:off x="0" y="4700775"/>
+            <a:ext cx="12192000" cy="2031325"/>
+          </a:xfrm>
+          <a:prstGeom prst="rect">
+            <a:avLst/>
+          </a:prstGeom>
+          <a:noFill/>
+        </p:spPr>
+        <p:txBody>
+          <a:bodyPr wrap="square" rtlCol="0">
+            <a:spAutoFit/>
+          </a:bodyPr>
+          <a:lstStyle/>
+          <a:p>
+            <a:pPr marL="342900" indent="-342900">
+              <a:buAutoNum type="arabicPeriod"/>
+            </a:pPr>
+            <a:r>
+              <a:rPr lang="cs-CZ" dirty="0"/>
+              <a:t>Největší % růst za měřitelné období zaznamenal sektor „Zdravotní a sociální péče“ s hodnotou 85%, u něhož nebyl taky zaznamenán meziroční platový pokles.</a:t>
+            </a:r>
+          </a:p>
+          <a:p>
+            <a:pPr marL="342900" indent="-342900">
+              <a:buFontTx/>
+              <a:buAutoNum type="arabicPeriod"/>
+            </a:pPr>
+            <a:r>
+              <a:rPr lang="cs-CZ" dirty="0"/>
+              <a:t>Ovšem největší růst ve finančním vyjádření zaznamenal sektor „Informační a komunikační činnosti“ s nárůstem o 20 915 kč, i když má za sebou jeden pokles.</a:t>
+            </a:r>
+          </a:p>
+          <a:p>
+            <a:pPr marL="342900" indent="-342900">
+              <a:buAutoNum type="arabicPeriod"/>
+            </a:pPr>
+            <a:r>
+              <a:rPr lang="cs-CZ" dirty="0"/>
+              <a:t>Ve třech sektorech rostli platy neustále.</a:t>
+            </a:r>
+          </a:p>
+          <a:p>
+            <a:pPr marL="342900" indent="-342900">
+              <a:buAutoNum type="arabicPeriod"/>
+            </a:pPr>
+            <a:r>
+              <a:rPr lang="cs-CZ" dirty="0"/>
+              <a:t>Nejvíce meziročních poklesů bylo zaznamenáno v roce 2013, kdy probíhala dluhová krize Eurozóny.</a:t>
+            </a:r>
+          </a:p>
+          <a:p>
+            <a:r>
+              <a:rPr lang="cs-CZ" dirty="0"/>
+              <a:t>	</a:t>
+            </a:r>
+          </a:p>
+        </p:txBody>
+      </p:sp>
+      <p:sp>
+        <p:nvSpPr>
+          <p:cNvPr id="2" name="TextovéPole 1">
+            <a:extLst>
+              <a:ext uri="{FF2B5EF4-FFF2-40B4-BE49-F238E27FC236}">
+                <a16:creationId xmlns:a16="http://schemas.microsoft.com/office/drawing/2014/main" id="{138E2711-7989-C818-C529-5281402C6362}"/>
+              </a:ext>
+            </a:extLst>
+          </p:cNvPr>
+          <p:cNvSpPr txBox="1"/>
+          <p:nvPr/>
+        </p:nvSpPr>
+        <p:spPr>
+          <a:xfrm>
+            <a:off x="4418091" y="2670181"/>
+            <a:ext cx="6092982" cy="230832"/>
+          </a:xfrm>
+          <a:prstGeom prst="rect">
+            <a:avLst/>
+          </a:prstGeom>
+          <a:noFill/>
+        </p:spPr>
+        <p:txBody>
+          <a:bodyPr wrap="square" rtlCol="0">
+            <a:spAutoFit/>
+          </a:bodyPr>
+          <a:lstStyle/>
+          <a:p>
+            <a:r>
+              <a:rPr lang="cs-CZ" sz="900" dirty="0"/>
+              <a:t>Průměrný měsíční plat a jeho vývoj napříč různými odvětvími v kč.</a:t>
+            </a:r>
+          </a:p>
+        </p:txBody>
+      </p:sp>
       <p:pic>
         <p:nvPicPr>
-          <p:cNvPr id="9" name="Obrázek 8">
-            <a:extLst>
-              <a:ext uri="{FF2B5EF4-FFF2-40B4-BE49-F238E27FC236}">
-                <a16:creationId xmlns:a16="http://schemas.microsoft.com/office/drawing/2014/main" id="{50489720-F11A-C21E-AEA9-484E4AE73AD8}"/>
+          <p:cNvPr id="4" name="Obrázek 3">
+            <a:extLst>
+              <a:ext uri="{FF2B5EF4-FFF2-40B4-BE49-F238E27FC236}">
+                <a16:creationId xmlns:a16="http://schemas.microsoft.com/office/drawing/2014/main" id="{4216DD15-4C43-A79C-BD35-2E74792FAAAC}"/>
               </a:ext>
             </a:extLst>
           </p:cNvPr>
@@ -3416,186 +3579,14 @@
         </p:blipFill>
         <p:spPr>
           <a:xfrm>
-            <a:off x="0" y="0"/>
-            <a:ext cx="12192000" cy="2675384"/>
+            <a:off x="0" y="-44390"/>
+            <a:ext cx="12192000" cy="2785013"/>
           </a:xfrm>
           <a:prstGeom prst="rect">
             <a:avLst/>
           </a:prstGeom>
         </p:spPr>
       </p:pic>
-      <p:sp>
-        <p:nvSpPr>
-          <p:cNvPr id="10" name="TextovéPole 9">
-            <a:extLst>
-              <a:ext uri="{FF2B5EF4-FFF2-40B4-BE49-F238E27FC236}">
-                <a16:creationId xmlns:a16="http://schemas.microsoft.com/office/drawing/2014/main" id="{E0236463-53FD-19CA-3EC5-428029808C21}"/>
-              </a:ext>
-            </a:extLst>
-          </p:cNvPr>
-          <p:cNvSpPr txBox="1"/>
-          <p:nvPr/>
-        </p:nvSpPr>
-        <p:spPr>
-          <a:xfrm>
-            <a:off x="0" y="3961628"/>
-            <a:ext cx="12192000" cy="923330"/>
-          </a:xfrm>
-          <a:prstGeom prst="rect">
-            <a:avLst/>
-          </a:prstGeom>
-          <a:noFill/>
-        </p:spPr>
-        <p:txBody>
-          <a:bodyPr wrap="square" rtlCol="0">
-            <a:spAutoFit/>
-          </a:bodyPr>
-          <a:lstStyle/>
-          <a:p>
-            <a:r>
-              <a:rPr lang="cs-CZ" dirty="0"/>
-              <a:t>V sloupci </a:t>
-            </a:r>
-            <a:r>
-              <a:rPr lang="cs-CZ" dirty="0" err="1"/>
-              <a:t>Diff</a:t>
-            </a:r>
-            <a:r>
-              <a:rPr lang="cs-CZ" dirty="0"/>
-              <a:t>. Vidíme o kolik se částka zvýšila za měřitelné období v peněžním vyjádření. V následném sloupci </a:t>
-            </a:r>
-            <a:r>
-              <a:rPr lang="cs-CZ" dirty="0" err="1"/>
-              <a:t>Growth</a:t>
-            </a:r>
-            <a:r>
-              <a:rPr lang="cs-CZ" dirty="0"/>
-              <a:t> je vyjádření v procentech.</a:t>
-            </a:r>
-          </a:p>
-          <a:p>
-            <a:r>
-              <a:rPr lang="cs-CZ" dirty="0"/>
-              <a:t>	</a:t>
-            </a:r>
-          </a:p>
-        </p:txBody>
-      </p:sp>
-      <p:sp>
-        <p:nvSpPr>
-          <p:cNvPr id="11" name="TextovéPole 10">
-            <a:extLst>
-              <a:ext uri="{FF2B5EF4-FFF2-40B4-BE49-F238E27FC236}">
-                <a16:creationId xmlns:a16="http://schemas.microsoft.com/office/drawing/2014/main" id="{0113A3A0-9844-180E-5825-DA7017604C5D}"/>
-              </a:ext>
-            </a:extLst>
-          </p:cNvPr>
-          <p:cNvSpPr txBox="1"/>
-          <p:nvPr/>
-        </p:nvSpPr>
-        <p:spPr>
-          <a:xfrm>
-            <a:off x="0" y="4700775"/>
-            <a:ext cx="12192000" cy="2031325"/>
-          </a:xfrm>
-          <a:prstGeom prst="rect">
-            <a:avLst/>
-          </a:prstGeom>
-          <a:noFill/>
-        </p:spPr>
-        <p:txBody>
-          <a:bodyPr wrap="square" rtlCol="0">
-            <a:spAutoFit/>
-          </a:bodyPr>
-          <a:lstStyle/>
-          <a:p>
-            <a:pPr marL="342900" indent="-342900">
-              <a:buAutoNum type="arabicPeriod"/>
-            </a:pPr>
-            <a:r>
-              <a:rPr lang="cs-CZ" dirty="0"/>
-              <a:t>Největší % růst za měřitelné období zaznamenal sektor „Zdravotní a sociální péče“ s hodnotou 76%, u něhož nebyl taky zaznamenán meziroční platový pokles.</a:t>
-            </a:r>
-          </a:p>
-          <a:p>
-            <a:pPr marL="342900" indent="-342900">
-              <a:buFontTx/>
-              <a:buAutoNum type="arabicPeriod"/>
-            </a:pPr>
-            <a:r>
-              <a:rPr lang="cs-CZ" dirty="0"/>
-              <a:t>Ovšem největší růst ve finančním vyjádření zaznamenal sektor „Informační a komunikační činnosti“ s nárůstem o 82 131 kč</a:t>
-            </a:r>
-            <a:r>
-              <a:rPr lang="cs-CZ"/>
-              <a:t>, i když má za sebou jeden pokles.</a:t>
-            </a:r>
-          </a:p>
-          <a:p>
-            <a:pPr marL="342900" indent="-342900">
-              <a:buAutoNum type="arabicPeriod"/>
-            </a:pPr>
-            <a:r>
-              <a:rPr lang="cs-CZ"/>
-              <a:t>V </a:t>
-            </a:r>
-            <a:r>
-              <a:rPr lang="cs-CZ" dirty="0"/>
-              <a:t>pěti sektorech rostli platy neustále.</a:t>
-            </a:r>
-          </a:p>
-          <a:p>
-            <a:pPr marL="342900" indent="-342900">
-              <a:buAutoNum type="arabicPeriod"/>
-            </a:pPr>
-            <a:r>
-              <a:rPr lang="cs-CZ" dirty="0"/>
-              <a:t>Nejvíce meziročních poklesů bylo zaznamenáno v roce 2013, kdy probíhala dluhová krize Eurozóny.</a:t>
-            </a:r>
-          </a:p>
-          <a:p>
-            <a:r>
-              <a:rPr lang="cs-CZ" dirty="0"/>
-              <a:t>	</a:t>
-            </a:r>
-          </a:p>
-        </p:txBody>
-      </p:sp>
-      <p:sp>
-        <p:nvSpPr>
-          <p:cNvPr id="2" name="TextovéPole 1">
-            <a:extLst>
-              <a:ext uri="{FF2B5EF4-FFF2-40B4-BE49-F238E27FC236}">
-                <a16:creationId xmlns:a16="http://schemas.microsoft.com/office/drawing/2014/main" id="{138E2711-7989-C818-C529-5281402C6362}"/>
-              </a:ext>
-            </a:extLst>
-          </p:cNvPr>
-          <p:cNvSpPr txBox="1"/>
-          <p:nvPr/>
-        </p:nvSpPr>
-        <p:spPr>
-          <a:xfrm>
-            <a:off x="4544840" y="2625207"/>
-            <a:ext cx="6092982" cy="230832"/>
-          </a:xfrm>
-          <a:prstGeom prst="rect">
-            <a:avLst/>
-          </a:prstGeom>
-          <a:noFill/>
-        </p:spPr>
-        <p:txBody>
-          <a:bodyPr wrap="square" rtlCol="0">
-            <a:spAutoFit/>
-          </a:bodyPr>
-          <a:lstStyle/>
-          <a:p>
-            <a:r>
-              <a:rPr lang="cs-CZ" sz="900" dirty="0"/>
-              <a:t>Platový vývoj napříč různými odvětvími v kč.</a:t>
-            </a:r>
-          </a:p>
-        </p:txBody>
-      </p:sp>
     </p:spTree>
     <p:extLst>
       <p:ext uri="{BB962C8B-B14F-4D97-AF65-F5344CB8AC3E}">
@@ -3654,17 +3645,17 @@
           <a:p>
             <a:r>
               <a:rPr lang="cs-CZ" dirty="0"/>
-              <a:t>Tabulka zobrazuje kolik si můžeme koupit chleba a mléka v prvním a posledním měřitelném roce. Vychází se z průměrných platů a průměrných cen. V posledním sloupci vidíme rozdílů mezi prvním a posledním měřitelném období.</a:t>
+              <a:t>Tabulka zobrazuje kolik si můžeme koupit chleba a mléka v prvním a posledním měřitelném roce. Vychází se z průměrných platů a průměrných cen. V posledním sloupci vidíme rozdíl mezi prvním a posledním měřitelném období.</a:t>
             </a:r>
           </a:p>
         </p:txBody>
       </p:sp>
       <p:pic>
         <p:nvPicPr>
-          <p:cNvPr id="5" name="Obrázek 4">
-            <a:extLst>
-              <a:ext uri="{FF2B5EF4-FFF2-40B4-BE49-F238E27FC236}">
-                <a16:creationId xmlns:a16="http://schemas.microsoft.com/office/drawing/2014/main" id="{860DDB59-6A50-AC01-FEDC-D5B11050BB47}"/>
+          <p:cNvPr id="4" name="Obrázek 3">
+            <a:extLst>
+              <a:ext uri="{FF2B5EF4-FFF2-40B4-BE49-F238E27FC236}">
+                <a16:creationId xmlns:a16="http://schemas.microsoft.com/office/drawing/2014/main" id="{86229D3D-A3F0-6F4D-8049-C679F4B35508}"/>
               </a:ext>
             </a:extLst>
           </p:cNvPr>
@@ -3681,8 +3672,8 @@
         </p:blipFill>
         <p:spPr>
           <a:xfrm>
-            <a:off x="489755" y="226103"/>
-            <a:ext cx="11212490" cy="647790"/>
+            <a:off x="504044" y="204650"/>
+            <a:ext cx="11183911" cy="600159"/>
           </a:xfrm>
           <a:prstGeom prst="rect">
             <a:avLst/>
@@ -3719,56 +3710,12 @@
           <a:chExt cx="0" cy="0"/>
         </a:xfrm>
       </p:grpSpPr>
-      <p:sp>
-        <p:nvSpPr>
-          <p:cNvPr id="3" name="Zástupný obsah 2">
-            <a:extLst>
-              <a:ext uri="{FF2B5EF4-FFF2-40B4-BE49-F238E27FC236}">
-                <a16:creationId xmlns:a16="http://schemas.microsoft.com/office/drawing/2014/main" id="{A04B159D-EED2-FDC4-7E95-4F5DF07A8222}"/>
-              </a:ext>
-            </a:extLst>
-          </p:cNvPr>
-          <p:cNvSpPr>
-            <a:spLocks noGrp="1"/>
-          </p:cNvSpPr>
-          <p:nvPr>
-            <p:ph idx="1"/>
-          </p:nvPr>
-        </p:nvSpPr>
-        <p:spPr>
-          <a:xfrm>
-            <a:off x="648076" y="4894749"/>
-            <a:ext cx="10976573" cy="1143912"/>
-          </a:xfrm>
-        </p:spPr>
-        <p:txBody>
-          <a:bodyPr/>
-          <a:lstStyle/>
-          <a:p>
-            <a:pPr marL="457200" lvl="1" indent="0">
-              <a:buNone/>
-            </a:pPr>
-            <a:r>
-              <a:rPr lang="cs-CZ" dirty="0"/>
-              <a:t>Data ukazují, která potravina rostla za měřitelné období nejpomaleji, nebo která zdražovala nejvíce. V sloupci </a:t>
-            </a:r>
-            <a:r>
-              <a:rPr lang="cs-CZ" dirty="0" err="1"/>
-              <a:t>Growth</a:t>
-            </a:r>
-            <a:r>
-              <a:rPr lang="cs-CZ" dirty="0"/>
-              <a:t> je procentuální rozdíl.</a:t>
-            </a:r>
-          </a:p>
-        </p:txBody>
-      </p:sp>
       <p:pic>
         <p:nvPicPr>
           <p:cNvPr id="5" name="Obrázek 4">
             <a:extLst>
               <a:ext uri="{FF2B5EF4-FFF2-40B4-BE49-F238E27FC236}">
-                <a16:creationId xmlns:a16="http://schemas.microsoft.com/office/drawing/2014/main" id="{7F6E8801-4069-6C5B-D344-9E9E33F26E7E}"/>
+                <a16:creationId xmlns:a16="http://schemas.microsoft.com/office/drawing/2014/main" id="{6F4B1B08-EBDD-4667-9C8C-1CA6DDE54683}"/>
               </a:ext>
             </a:extLst>
           </p:cNvPr>
@@ -3785,18 +3732,67 @@
         </p:blipFill>
         <p:spPr>
           <a:xfrm>
-            <a:off x="909825" y="0"/>
-            <a:ext cx="10155067" cy="4706007"/>
+            <a:off x="751187" y="0"/>
+            <a:ext cx="10345594" cy="4801270"/>
           </a:xfrm>
           <a:prstGeom prst="rect">
             <a:avLst/>
           </a:prstGeom>
         </p:spPr>
       </p:pic>
+      <p:sp>
+        <p:nvSpPr>
+          <p:cNvPr id="6" name="TextovéPole 5">
+            <a:extLst>
+              <a:ext uri="{FF2B5EF4-FFF2-40B4-BE49-F238E27FC236}">
+                <a16:creationId xmlns:a16="http://schemas.microsoft.com/office/drawing/2014/main" id="{E3EF3C3F-6D40-5978-390C-DFA194CF327C}"/>
+              </a:ext>
+            </a:extLst>
+          </p:cNvPr>
+          <p:cNvSpPr txBox="1"/>
+          <p:nvPr/>
+        </p:nvSpPr>
+        <p:spPr>
+          <a:xfrm>
+            <a:off x="669956" y="5024673"/>
+            <a:ext cx="10345594" cy="923330"/>
+          </a:xfrm>
+          <a:prstGeom prst="rect">
+            <a:avLst/>
+          </a:prstGeom>
+          <a:noFill/>
+        </p:spPr>
+        <p:txBody>
+          <a:bodyPr wrap="square" rtlCol="0">
+            <a:spAutoFit/>
+          </a:bodyPr>
+          <a:lstStyle/>
+          <a:p>
+            <a:r>
+              <a:rPr lang="cs-CZ" dirty="0"/>
+              <a:t>Přehled růstu potravin. V posledním sloupci je spočítán celkový růst/pokles, za měřitelné období. </a:t>
+            </a:r>
+          </a:p>
+          <a:p>
+            <a:r>
+              <a:rPr lang="cs-CZ" dirty="0"/>
+              <a:t>Rajská jablka zlevňovala, zatímco nejvíce zdražovalo Máslo. Z celkového pohledu je vidět, že jsou některé kategorie potravin docela </a:t>
+            </a:r>
+            <a:r>
+              <a:rPr lang="cs-CZ" dirty="0" err="1"/>
+              <a:t>volalitní</a:t>
+            </a:r>
+            <a:r>
+              <a:rPr lang="cs-CZ" dirty="0"/>
+              <a:t>.</a:t>
+            </a:r>
+          </a:p>
+        </p:txBody>
+      </p:sp>
     </p:spTree>
     <p:extLst>
       <p:ext uri="{BB962C8B-B14F-4D97-AF65-F5344CB8AC3E}">
-        <p14:creationId xmlns:p14="http://schemas.microsoft.com/office/powerpoint/2010/main" val="2363313937"/>
+        <p14:creationId xmlns:p14="http://schemas.microsoft.com/office/powerpoint/2010/main" val="2995049402"/>
       </p:ext>
     </p:extLst>
   </p:cSld>
@@ -3823,12 +3819,71 @@
           <a:chExt cx="0" cy="0"/>
         </a:xfrm>
       </p:grpSpPr>
+      <p:sp>
+        <p:nvSpPr>
+          <p:cNvPr id="3" name="Zástupný obsah 2">
+            <a:extLst>
+              <a:ext uri="{FF2B5EF4-FFF2-40B4-BE49-F238E27FC236}">
+                <a16:creationId xmlns:a16="http://schemas.microsoft.com/office/drawing/2014/main" id="{C573A0CD-C5AC-FAD6-208B-BE70674A48A3}"/>
+              </a:ext>
+            </a:extLst>
+          </p:cNvPr>
+          <p:cNvSpPr>
+            <a:spLocks noGrp="1"/>
+          </p:cNvSpPr>
+          <p:nvPr>
+            <p:ph idx="1"/>
+          </p:nvPr>
+        </p:nvSpPr>
+        <p:spPr>
+          <a:xfrm>
+            <a:off x="838200" y="2577063"/>
+            <a:ext cx="10515600" cy="4351338"/>
+          </a:xfrm>
+        </p:spPr>
+        <p:txBody>
+          <a:bodyPr/>
+          <a:lstStyle/>
+          <a:p>
+            <a:r>
+              <a:rPr lang="cs-CZ" dirty="0"/>
+              <a:t>Data ukazují výši průměrného měsíčního platu za celý rok a průměr všech cen za celý rok.</a:t>
+            </a:r>
+          </a:p>
+          <a:p>
+            <a:r>
+              <a:rPr lang="cs-CZ" dirty="0"/>
+              <a:t>Následuje výpočet meziročního růstu platů a meziročního růstu cen potravin.</a:t>
+            </a:r>
+          </a:p>
+          <a:p>
+            <a:endParaRPr lang="cs-CZ" dirty="0"/>
+          </a:p>
+          <a:p>
+            <a:pPr marL="0" indent="0">
+              <a:buNone/>
+            </a:pPr>
+            <a:r>
+              <a:rPr lang="cs-CZ" dirty="0"/>
+              <a:t>Z dat je vidět, že potraviny nerostli </a:t>
+            </a:r>
+            <a:r>
+              <a:rPr lang="cs-CZ" dirty="0" err="1"/>
+              <a:t>výraznějí</a:t>
+            </a:r>
+            <a:r>
+              <a:rPr lang="cs-CZ" dirty="0"/>
+              <a:t> než platy. Největší růst potravin, oproti platům byl zaznamenán v roce 2013, s rozdílovou hodnotou 6,71%</a:t>
+            </a:r>
+          </a:p>
+        </p:txBody>
+      </p:sp>
       <p:pic>
         <p:nvPicPr>
-          <p:cNvPr id="5" name="Obrázek 4">
-            <a:extLst>
-              <a:ext uri="{FF2B5EF4-FFF2-40B4-BE49-F238E27FC236}">
-                <a16:creationId xmlns:a16="http://schemas.microsoft.com/office/drawing/2014/main" id="{6F4B1B08-EBDD-4667-9C8C-1CA6DDE54683}"/>
+          <p:cNvPr id="4" name="Obrázek 3">
+            <a:extLst>
+              <a:ext uri="{FF2B5EF4-FFF2-40B4-BE49-F238E27FC236}">
+                <a16:creationId xmlns:a16="http://schemas.microsoft.com/office/drawing/2014/main" id="{6075204F-6E9D-DA00-411C-AA7AAE1582D1}"/>
               </a:ext>
             </a:extLst>
           </p:cNvPr>
@@ -3845,80 +3900,18 @@
         </p:blipFill>
         <p:spPr>
           <a:xfrm>
-            <a:off x="751187" y="0"/>
-            <a:ext cx="10345594" cy="4801270"/>
+            <a:off x="1382796" y="93010"/>
+            <a:ext cx="9154803" cy="2362530"/>
           </a:xfrm>
           <a:prstGeom prst="rect">
             <a:avLst/>
           </a:prstGeom>
         </p:spPr>
       </p:pic>
-      <p:sp>
-        <p:nvSpPr>
-          <p:cNvPr id="6" name="TextovéPole 5">
-            <a:extLst>
-              <a:ext uri="{FF2B5EF4-FFF2-40B4-BE49-F238E27FC236}">
-                <a16:creationId xmlns:a16="http://schemas.microsoft.com/office/drawing/2014/main" id="{E3EF3C3F-6D40-5978-390C-DFA194CF327C}"/>
-              </a:ext>
-            </a:extLst>
-          </p:cNvPr>
-          <p:cNvSpPr txBox="1"/>
-          <p:nvPr/>
-        </p:nvSpPr>
-        <p:spPr>
-          <a:xfrm>
-            <a:off x="669956" y="5024673"/>
-            <a:ext cx="10345594" cy="923330"/>
-          </a:xfrm>
-          <a:prstGeom prst="rect">
-            <a:avLst/>
-          </a:prstGeom>
-          <a:noFill/>
-        </p:spPr>
-        <p:txBody>
-          <a:bodyPr wrap="square" rtlCol="0">
-            <a:spAutoFit/>
-          </a:bodyPr>
-          <a:lstStyle/>
-          <a:p>
-            <a:r>
-              <a:rPr lang="cs-CZ" dirty="0"/>
-              <a:t>Přehled růstu potravin. V posledním sloupci je spočítán celkový růst/pokles, za měřitelné období. </a:t>
-            </a:r>
-          </a:p>
-          <a:p>
-            <a:r>
-              <a:rPr lang="cs-CZ" dirty="0" err="1"/>
-              <a:t>Rajcka</a:t>
-            </a:r>
-            <a:r>
-              <a:rPr lang="cs-CZ" dirty="0"/>
-              <a:t> jablka zlevňovala, </a:t>
-            </a:r>
-            <a:r>
-              <a:rPr lang="cs-CZ" dirty="0" err="1"/>
-              <a:t>zatímto</a:t>
-            </a:r>
-            <a:r>
-              <a:rPr lang="cs-CZ" dirty="0"/>
-              <a:t> nejvíce zdražovalo Máslo. Z celkového pohledu je vidět, že jsou některé kategorie potravin docela </a:t>
-            </a:r>
-            <a:r>
-              <a:rPr lang="cs-CZ" dirty="0" err="1"/>
-              <a:t>volalitní</a:t>
-            </a:r>
-            <a:r>
-              <a:rPr lang="cs-CZ"/>
-              <a:t>.</a:t>
-            </a:r>
-            <a:endParaRPr lang="cs-CZ" dirty="0"/>
-          </a:p>
-        </p:txBody>
-      </p:sp>
     </p:spTree>
     <p:extLst>
       <p:ext uri="{BB962C8B-B14F-4D97-AF65-F5344CB8AC3E}">
-        <p14:creationId xmlns:p14="http://schemas.microsoft.com/office/powerpoint/2010/main" val="2995049402"/>
+        <p14:creationId xmlns:p14="http://schemas.microsoft.com/office/powerpoint/2010/main" val="3086538568"/>
       </p:ext>
     </p:extLst>
   </p:cSld>
@@ -3950,7 +3943,7 @@
           <p:cNvPr id="3" name="Zástupný obsah 2">
             <a:extLst>
               <a:ext uri="{FF2B5EF4-FFF2-40B4-BE49-F238E27FC236}">
-                <a16:creationId xmlns:a16="http://schemas.microsoft.com/office/drawing/2014/main" id="{C573A0CD-C5AC-FAD6-208B-BE70674A48A3}"/>
+                <a16:creationId xmlns:a16="http://schemas.microsoft.com/office/drawing/2014/main" id="{9A1A917E-AC3E-4EBB-5C0A-515172E8F5A4}"/>
               </a:ext>
             </a:extLst>
           </p:cNvPr>
@@ -3963,53 +3956,116 @@
         </p:nvSpPr>
         <p:spPr>
           <a:xfrm>
-            <a:off x="838200" y="2577063"/>
+            <a:off x="838200" y="2410161"/>
             <a:ext cx="10515600" cy="4351338"/>
           </a:xfrm>
         </p:spPr>
         <p:txBody>
-          <a:bodyPr/>
-          <a:lstStyle/>
-          <a:p>
-            <a:r>
-              <a:rPr lang="cs-CZ" dirty="0"/>
-              <a:t>Data ukazují výši průměrných platů za celý rok, průměr všech cen za celý rok.</a:t>
-            </a:r>
-          </a:p>
-          <a:p>
-            <a:r>
-              <a:rPr lang="cs-CZ" dirty="0"/>
-              <a:t>Následuje výpočet meziročního růstu platů a meziročního růstu cen potravin.</a:t>
-            </a:r>
-          </a:p>
-          <a:p>
-            <a:endParaRPr lang="cs-CZ" dirty="0"/>
-          </a:p>
+          <a:bodyPr>
+            <a:normAutofit lnSpcReduction="10000"/>
+          </a:bodyPr>
+          <a:lstStyle/>
           <a:p>
             <a:pPr marL="0" indent="0">
               <a:buNone/>
             </a:pPr>
             <a:r>
-              <a:rPr lang="cs-CZ" dirty="0"/>
-              <a:t>Z dat je vidět, že potraviny nerostli </a:t>
-            </a:r>
-            <a:r>
-              <a:rPr lang="cs-CZ" dirty="0" err="1"/>
-              <a:t>výraznějí</a:t>
-            </a:r>
-            <a:r>
-              <a:rPr lang="cs-CZ" dirty="0"/>
-              <a:t> než platy. Největší růst potravin, oproti platům byl zaznamenán v roce 2013, s rozdílovou hodnotou 6,71%</a:t>
+              <a:rPr lang="cs-CZ" sz="2000" dirty="0"/>
+              <a:t>Zde máme stejnou tabulku z předchozí stránky, doplněnou o meziroční růst HDP.</a:t>
+            </a:r>
+          </a:p>
+          <a:p>
+            <a:pPr marL="0" indent="0">
+              <a:buNone/>
+            </a:pPr>
+            <a:r>
+              <a:rPr lang="cs-CZ" sz="2000" dirty="0"/>
+              <a:t>Vidíme zde několik poklesů HDP. Který byl dán ekonomickou krizí 2008 a krizí eurozóny.</a:t>
+            </a:r>
+          </a:p>
+          <a:p>
+            <a:pPr marL="0" indent="0">
+              <a:buNone/>
+            </a:pPr>
+            <a:r>
+              <a:rPr lang="cs-CZ" sz="2000" dirty="0"/>
+              <a:t>Pokud budeme chtít opovědět na otázku, jestli s výrazným růstem HDP rostou i mzdy a potraviny.</a:t>
+            </a:r>
+          </a:p>
+          <a:p>
+            <a:pPr marL="0" indent="0">
+              <a:buNone/>
+            </a:pPr>
+            <a:r>
+              <a:rPr lang="cs-CZ" sz="2000" dirty="0"/>
+              <a:t> 	K výraznějšímu růstu HDP (nad 5%) došlo ve třech případech.</a:t>
+            </a:r>
+          </a:p>
+          <a:p>
+            <a:pPr marL="0" indent="0">
+              <a:buNone/>
+            </a:pPr>
+            <a:r>
+              <a:rPr lang="cs-CZ" sz="2000" dirty="0"/>
+              <a:t>	rok 2007		V tomto roce je vidět i růst mezd a růst cen a to i v roce následujícím.</a:t>
+            </a:r>
+          </a:p>
+          <a:p>
+            <a:pPr marL="0" indent="0">
+              <a:buNone/>
+            </a:pPr>
+            <a:r>
+              <a:rPr lang="cs-CZ" sz="2000" dirty="0"/>
+              <a:t>	rok 2015		Růst mezd je nepatrný. U cen je zaznamenám pokles</a:t>
+            </a:r>
+          </a:p>
+          <a:p>
+            <a:pPr marL="0" indent="0">
+              <a:buNone/>
+            </a:pPr>
+            <a:r>
+              <a:rPr lang="cs-CZ" sz="2000" dirty="0"/>
+              <a:t>	rok 2017		V tomto i následujícím roce vidíme stejnou situaci jako </a:t>
+            </a:r>
+          </a:p>
+          <a:p>
+            <a:pPr marL="0" indent="0">
+              <a:buNone/>
+            </a:pPr>
+            <a:r>
+              <a:rPr lang="cs-CZ" sz="2000" dirty="0"/>
+              <a:t>			v roce 2007. Došlo k růstu platů i cen a to i v roce následujícím.</a:t>
+            </a:r>
+          </a:p>
+          <a:p>
+            <a:pPr marL="0" indent="0">
+              <a:buNone/>
+            </a:pPr>
+            <a:r>
+              <a:rPr lang="cs-CZ" sz="1600" dirty="0"/>
+              <a:t>Nedá se úplně odpovědět na otázku, zdali s výraznějším růstem HDP automaticky výrazněji rostou platy i ceny potravin. Pravděpodobnost je dvoutřetinová. Růst HDP ovlivňuje růst potravin nepřímo (výše platů se projeví do nákladů). Odchylka, která nastala v roce 2015 může být dána tím, že v ekonomice nebylo stejné prostředí jako v roce 2007 a 2015. Mohli být jiné úrokové sazby, ceny </a:t>
+            </a:r>
+            <a:r>
+              <a:rPr lang="cs-CZ" sz="1600" err="1"/>
+              <a:t>energií</a:t>
+            </a:r>
+            <a:r>
+              <a:rPr lang="cs-CZ" sz="1600"/>
+              <a:t>,rozdílné</a:t>
+            </a:r>
+            <a:r>
+              <a:rPr lang="cs-CZ" sz="1600" dirty="0"/>
+              <a:t> ekonomické vládní stimuly pro firmy a rodiny. Potřebovali bychom více dat, abych zjistili proč v tento rok výrazněji mzdy a ceny potravin nevzrostli.</a:t>
             </a:r>
           </a:p>
         </p:txBody>
       </p:sp>
       <p:pic>
         <p:nvPicPr>
-          <p:cNvPr id="7" name="Obrázek 6">
-            <a:extLst>
-              <a:ext uri="{FF2B5EF4-FFF2-40B4-BE49-F238E27FC236}">
-                <a16:creationId xmlns:a16="http://schemas.microsoft.com/office/drawing/2014/main" id="{A8C614E4-F169-F959-E757-C9293BDA0EA7}"/>
+          <p:cNvPr id="4" name="Obrázek 3">
+            <a:extLst>
+              <a:ext uri="{FF2B5EF4-FFF2-40B4-BE49-F238E27FC236}">
+                <a16:creationId xmlns:a16="http://schemas.microsoft.com/office/drawing/2014/main" id="{08CA0126-85FA-D82A-E1FF-4CFDAB6826AD}"/>
               </a:ext>
             </a:extLst>
           </p:cNvPr>
@@ -4026,190 +4082,8 @@
         </p:blipFill>
         <p:spPr>
           <a:xfrm>
-            <a:off x="1789961" y="90691"/>
-            <a:ext cx="7887801" cy="2486372"/>
-          </a:xfrm>
-          <a:prstGeom prst="rect">
-            <a:avLst/>
-          </a:prstGeom>
-        </p:spPr>
-      </p:pic>
-    </p:spTree>
-    <p:extLst>
-      <p:ext uri="{BB962C8B-B14F-4D97-AF65-F5344CB8AC3E}">
-        <p14:creationId xmlns:p14="http://schemas.microsoft.com/office/powerpoint/2010/main" val="3086538568"/>
-      </p:ext>
-    </p:extLst>
-  </p:cSld>
-  <p:clrMapOvr>
-    <a:masterClrMapping/>
-  </p:clrMapOvr>
-</p:sld>
-</file>
-
-<file path=ppt/slides/slide6.xml><?xml version="1.0" encoding="utf-8"?>
-<p:sld xmlns:a="http://schemas.openxmlformats.org/drawingml/2006/main" xmlns:r="http://schemas.openxmlformats.org/officeDocument/2006/relationships" xmlns:p="http://schemas.openxmlformats.org/presentationml/2006/main">
-  <p:cSld>
-    <p:spTree>
-      <p:nvGrpSpPr>
-        <p:cNvPr id="1" name=""/>
-        <p:cNvGrpSpPr/>
-        <p:nvPr/>
-      </p:nvGrpSpPr>
-      <p:grpSpPr>
-        <a:xfrm>
-          <a:off x="0" y="0"/>
-          <a:ext cx="0" cy="0"/>
-          <a:chOff x="0" y="0"/>
-          <a:chExt cx="0" cy="0"/>
-        </a:xfrm>
-      </p:grpSpPr>
-      <p:sp>
-        <p:nvSpPr>
-          <p:cNvPr id="3" name="Zástupný obsah 2">
-            <a:extLst>
-              <a:ext uri="{FF2B5EF4-FFF2-40B4-BE49-F238E27FC236}">
-                <a16:creationId xmlns:a16="http://schemas.microsoft.com/office/drawing/2014/main" id="{9A1A917E-AC3E-4EBB-5C0A-515172E8F5A4}"/>
-              </a:ext>
-            </a:extLst>
-          </p:cNvPr>
-          <p:cNvSpPr>
-            <a:spLocks noGrp="1"/>
-          </p:cNvSpPr>
-          <p:nvPr>
-            <p:ph idx="1"/>
-          </p:nvPr>
-        </p:nvSpPr>
-        <p:spPr>
-          <a:xfrm>
-            <a:off x="838200" y="2410161"/>
-            <a:ext cx="10515600" cy="4351338"/>
-          </a:xfrm>
-        </p:spPr>
-        <p:txBody>
-          <a:bodyPr>
-            <a:normAutofit lnSpcReduction="10000"/>
-          </a:bodyPr>
-          <a:lstStyle/>
-          <a:p>
-            <a:pPr marL="0" indent="0">
-              <a:buNone/>
-            </a:pPr>
-            <a:r>
-              <a:rPr lang="cs-CZ" sz="2000" dirty="0"/>
-              <a:t>Zde máme stejnou tabulku z předchozí stránky, doplněnou o meziroční růst HDP.</a:t>
-            </a:r>
-          </a:p>
-          <a:p>
-            <a:pPr marL="0" indent="0">
-              <a:buNone/>
-            </a:pPr>
-            <a:r>
-              <a:rPr lang="cs-CZ" sz="2000" dirty="0"/>
-              <a:t>Vidíme zde několik poklesů HDP. Který byl dán ekonomickou krizí 2008 a krizí eurozóny.</a:t>
-            </a:r>
-          </a:p>
-          <a:p>
-            <a:pPr marL="0" indent="0">
-              <a:buNone/>
-            </a:pPr>
-            <a:r>
-              <a:rPr lang="cs-CZ" sz="2000" dirty="0"/>
-              <a:t>Pokud budeme chtít opovědět na otázku, jestli s výrazným růstem HDP rostou i mzdy a potraviny.</a:t>
-            </a:r>
-          </a:p>
-          <a:p>
-            <a:pPr marL="0" indent="0">
-              <a:buNone/>
-            </a:pPr>
-            <a:r>
-              <a:rPr lang="cs-CZ" sz="2000" dirty="0"/>
-              <a:t> 	K výraznějšímu růstu HDP (nad 5%) došlo ve třech případech.</a:t>
-            </a:r>
-          </a:p>
-          <a:p>
-            <a:pPr marL="0" indent="0">
-              <a:buNone/>
-            </a:pPr>
-            <a:r>
-              <a:rPr lang="cs-CZ" sz="2000" dirty="0"/>
-              <a:t>	rok 2007		V tomto roce je vidět i růst mezd a růst cen a to i v roce následujícím.</a:t>
-            </a:r>
-          </a:p>
-          <a:p>
-            <a:pPr marL="0" indent="0">
-              <a:buNone/>
-            </a:pPr>
-            <a:r>
-              <a:rPr lang="cs-CZ" sz="2000" dirty="0"/>
-              <a:t>	rok 2015		Růst mezd je nepatrný. U cen je zaznamenám pokles</a:t>
-            </a:r>
-          </a:p>
-          <a:p>
-            <a:pPr marL="0" indent="0">
-              <a:buNone/>
-            </a:pPr>
-            <a:r>
-              <a:rPr lang="cs-CZ" sz="2000" dirty="0"/>
-              <a:t>	rok 2017		V tomto i následujícím roce vidíme stejnou situaci jako </a:t>
-            </a:r>
-          </a:p>
-          <a:p>
-            <a:pPr marL="0" indent="0">
-              <a:buNone/>
-            </a:pPr>
-            <a:r>
-              <a:rPr lang="cs-CZ" sz="2000" dirty="0"/>
-              <a:t>			v roce 2007. Došlo k růstu platů i cen a to i v roce následujícím.</a:t>
-            </a:r>
-          </a:p>
-          <a:p>
-            <a:pPr marL="0" indent="0">
-              <a:buNone/>
-            </a:pPr>
-            <a:r>
-              <a:rPr lang="cs-CZ" sz="1600" dirty="0"/>
-              <a:t>Nedá se úplně odpovědět na otázku, zdali s výraznějším růstem HDP automaticky výrazněji rostou platy i ceny potravin. Pravděpodobnost je dvoutřetinová. Růst HDP ovlivňuje růst potravin nepřímo (výše platů se projeví do nákladů). Odchylka, která nastala v roce 2015 může být dána tím, že v ekonomice nebylo stejné prostředí jako v roce 2007 a 2015. Mohli být jiné úrokové sazby, ceny </a:t>
-            </a:r>
-            <a:r>
-              <a:rPr lang="cs-CZ" sz="1600" err="1"/>
-              <a:t>energií</a:t>
-            </a:r>
-            <a:r>
-              <a:rPr lang="cs-CZ" sz="1600"/>
-              <a:t>,rozdílné</a:t>
-            </a:r>
-            <a:r>
-              <a:rPr lang="cs-CZ" sz="1600" dirty="0"/>
-              <a:t> ekonomické vládní stimuly pro firmy a rodiny. Potřebovali bychom více dat, abych zjistili proč v tento rok výrazněji mzdy a ceny potravin nevzrostli.</a:t>
-            </a:r>
-          </a:p>
-        </p:txBody>
-      </p:sp>
-      <p:pic>
-        <p:nvPicPr>
-          <p:cNvPr id="5" name="Obrázek 4">
-            <a:extLst>
-              <a:ext uri="{FF2B5EF4-FFF2-40B4-BE49-F238E27FC236}">
-                <a16:creationId xmlns:a16="http://schemas.microsoft.com/office/drawing/2014/main" id="{B1676D86-64F5-6C02-4618-86D9031C4594}"/>
-              </a:ext>
-            </a:extLst>
-          </p:cNvPr>
-          <p:cNvPicPr>
-            <a:picLocks noChangeAspect="1"/>
-          </p:cNvPicPr>
-          <p:nvPr/>
-        </p:nvPicPr>
-        <p:blipFill>
-          <a:blip r:embed="rId2"/>
-          <a:stretch>
-            <a:fillRect/>
-          </a:stretch>
-        </p:blipFill>
-        <p:spPr>
-          <a:xfrm>
-            <a:off x="1251319" y="0"/>
-            <a:ext cx="9345329" cy="2410161"/>
+            <a:off x="550942" y="28579"/>
+            <a:ext cx="10802858" cy="2381582"/>
           </a:xfrm>
           <a:prstGeom prst="rect">
             <a:avLst/>

</xml_diff>